<commit_message>
updated the Presentation with teh fullstack layout
</commit_message>
<xml_diff>
--- a/Presentation/Project 1 Presentation.pptx
+++ b/Presentation/Project 1 Presentation.pptx
@@ -5162,6 +5162,14 @@
 <file path=ppt/slides/slide10.xml><?xml version="1.0" encoding="utf-8"?>
 <p:sld xmlns:a="http://schemas.openxmlformats.org/drawingml/2006/main" xmlns:r="http://schemas.openxmlformats.org/officeDocument/2006/relationships" xmlns:p="http://schemas.openxmlformats.org/presentationml/2006/main">
   <p:cSld>
+    <p:bg>
+      <p:bgPr>
+        <a:solidFill>
+          <a:schemeClr val="bg1"/>
+        </a:solidFill>
+        <a:effectLst/>
+      </p:bgPr>
+    </p:bg>
     <p:spTree>
       <p:nvGrpSpPr>
         <p:cNvPr id="1" name=""/>
@@ -5178,6 +5186,229 @@
       </p:grpSpPr>
       <p:sp>
         <p:nvSpPr>
+          <p:cNvPr id="25" name="Rectangle 18">
+            <a:extLst>
+              <a:ext uri="{FF2B5EF4-FFF2-40B4-BE49-F238E27FC236}">
+                <a16:creationId xmlns:a16="http://schemas.microsoft.com/office/drawing/2014/main" id="{B6EE7E08-B389-43E5-B019-1B0A8ACBBD93}"/>
+              </a:ext>
+              <a:ext uri="{C183D7F6-B498-43B3-948B-1728B52AA6E4}">
+                <adec:decorative xmlns:adec="http://schemas.microsoft.com/office/drawing/2017/decorative" val="1"/>
+              </a:ext>
+            </a:extLst>
+          </p:cNvPr>
+          <p:cNvSpPr>
+            <a:spLocks noGrp="1" noRot="1" noChangeAspect="1" noMove="1" noResize="1" noEditPoints="1" noAdjustHandles="1" noChangeArrowheads="1" noChangeShapeType="1" noTextEdit="1"/>
+          </p:cNvSpPr>
+          <p:nvPr>
+            <p:extLst>
+              <p:ext uri="{386F3935-93C4-4BCD-93E2-E3B085C9AB24}">
+                <p16:designElem xmlns:p16="http://schemas.microsoft.com/office/powerpoint/2015/main" val="1"/>
+              </p:ext>
+            </p:extLst>
+          </p:nvPr>
+        </p:nvSpPr>
+        <p:spPr>
+          <a:xfrm>
+            <a:off x="-1" y="0"/>
+            <a:ext cx="12192001" cy="6858000"/>
+          </a:xfrm>
+          <a:prstGeom prst="rect">
+            <a:avLst/>
+          </a:prstGeom>
+          <a:solidFill>
+            <a:srgbClr val="FFFFFF"/>
+          </a:solidFill>
+          <a:ln>
+            <a:noFill/>
+          </a:ln>
+        </p:spPr>
+        <p:style>
+          <a:lnRef idx="2">
+            <a:schemeClr val="accent1">
+              <a:shade val="50000"/>
+            </a:schemeClr>
+          </a:lnRef>
+          <a:fillRef idx="1">
+            <a:schemeClr val="accent1"/>
+          </a:fillRef>
+          <a:effectRef idx="0">
+            <a:schemeClr val="accent1"/>
+          </a:effectRef>
+          <a:fontRef idx="minor">
+            <a:schemeClr val="lt1"/>
+          </a:fontRef>
+        </p:style>
+        <p:txBody>
+          <a:bodyPr rtlCol="0" anchor="ctr"/>
+          <a:lstStyle/>
+          <a:p>
+            <a:pPr algn="ctr"/>
+            <a:endParaRPr lang="en-US"/>
+          </a:p>
+        </p:txBody>
+      </p:sp>
+      <p:pic>
+        <p:nvPicPr>
+          <p:cNvPr id="5" name="Picture 4" descr="A screenshot of a cell phone&#10;&#10;Description automatically generated">
+            <a:extLst>
+              <a:ext uri="{FF2B5EF4-FFF2-40B4-BE49-F238E27FC236}">
+                <a16:creationId xmlns:a16="http://schemas.microsoft.com/office/drawing/2014/main" id="{15F26818-CD45-9446-AF0F-38755EAB00F9}"/>
+              </a:ext>
+            </a:extLst>
+          </p:cNvPr>
+          <p:cNvPicPr>
+            <a:picLocks noChangeAspect="1"/>
+          </p:cNvPicPr>
+          <p:nvPr/>
+        </p:nvPicPr>
+        <p:blipFill rotWithShape="1">
+          <a:blip r:embed="rId2"/>
+          <a:srcRect t="11417"/>
+          <a:stretch/>
+        </p:blipFill>
+        <p:spPr>
+          <a:xfrm>
+            <a:off x="20" y="-1"/>
+            <a:ext cx="12191980" cy="6857999"/>
+          </a:xfrm>
+          <a:prstGeom prst="rect">
+            <a:avLst/>
+          </a:prstGeom>
+        </p:spPr>
+      </p:pic>
+      <p:sp>
+        <p:nvSpPr>
+          <p:cNvPr id="26" name="Rectangle 20">
+            <a:extLst>
+              <a:ext uri="{FF2B5EF4-FFF2-40B4-BE49-F238E27FC236}">
+                <a16:creationId xmlns:a16="http://schemas.microsoft.com/office/drawing/2014/main" id="{E60D94A5-8A09-4BAB-8F7C-69BC34C54DDE}"/>
+              </a:ext>
+              <a:ext uri="{C183D7F6-B498-43B3-948B-1728B52AA6E4}">
+                <adec:decorative xmlns:adec="http://schemas.microsoft.com/office/drawing/2017/decorative" val="1"/>
+              </a:ext>
+            </a:extLst>
+          </p:cNvPr>
+          <p:cNvSpPr>
+            <a:spLocks noGrp="1" noRot="1" noChangeAspect="1" noMove="1" noResize="1" noEditPoints="1" noAdjustHandles="1" noChangeArrowheads="1" noChangeShapeType="1" noTextEdit="1"/>
+          </p:cNvSpPr>
+          <p:nvPr>
+            <p:extLst>
+              <p:ext uri="{386F3935-93C4-4BCD-93E2-E3B085C9AB24}">
+                <p16:designElem xmlns:p16="http://schemas.microsoft.com/office/powerpoint/2015/main" val="1"/>
+              </p:ext>
+            </p:extLst>
+          </p:nvPr>
+        </p:nvSpPr>
+        <p:spPr>
+          <a:xfrm>
+            <a:off x="6211489" y="642594"/>
+            <a:ext cx="5342133" cy="5572812"/>
+          </a:xfrm>
+          <a:prstGeom prst="rect">
+            <a:avLst/>
+          </a:prstGeom>
+          <a:solidFill>
+            <a:schemeClr val="bg1">
+              <a:alpha val="94000"/>
+            </a:schemeClr>
+          </a:solidFill>
+          <a:ln>
+            <a:noFill/>
+          </a:ln>
+        </p:spPr>
+        <p:style>
+          <a:lnRef idx="2">
+            <a:schemeClr val="accent1">
+              <a:shade val="50000"/>
+            </a:schemeClr>
+          </a:lnRef>
+          <a:fillRef idx="1">
+            <a:schemeClr val="accent1"/>
+          </a:fillRef>
+          <a:effectRef idx="0">
+            <a:schemeClr val="accent1"/>
+          </a:effectRef>
+          <a:fontRef idx="minor">
+            <a:schemeClr val="lt1"/>
+          </a:fontRef>
+        </p:style>
+        <p:txBody>
+          <a:bodyPr rtlCol="0" anchor="ctr"/>
+          <a:lstStyle/>
+          <a:p>
+            <a:pPr algn="ctr"/>
+            <a:endParaRPr lang="en-US"/>
+          </a:p>
+        </p:txBody>
+      </p:sp>
+      <p:sp>
+        <p:nvSpPr>
+          <p:cNvPr id="27" name="Rectangle 22">
+            <a:extLst>
+              <a:ext uri="{FF2B5EF4-FFF2-40B4-BE49-F238E27FC236}">
+                <a16:creationId xmlns:a16="http://schemas.microsoft.com/office/drawing/2014/main" id="{7A1AE32B-3A6E-4C5E-8FEB-73861B9A26B5}"/>
+              </a:ext>
+              <a:ext uri="{C183D7F6-B498-43B3-948B-1728B52AA6E4}">
+                <adec:decorative xmlns:adec="http://schemas.microsoft.com/office/drawing/2017/decorative" val="1"/>
+              </a:ext>
+            </a:extLst>
+          </p:cNvPr>
+          <p:cNvSpPr>
+            <a:spLocks noGrp="1" noRot="1" noChangeAspect="1" noMove="1" noResize="1" noEditPoints="1" noAdjustHandles="1" noChangeArrowheads="1" noChangeShapeType="1" noTextEdit="1"/>
+          </p:cNvSpPr>
+          <p:nvPr>
+            <p:extLst>
+              <p:ext uri="{386F3935-93C4-4BCD-93E2-E3B085C9AB24}">
+                <p16:designElem xmlns:p16="http://schemas.microsoft.com/office/powerpoint/2015/main" val="1"/>
+              </p:ext>
+            </p:extLst>
+          </p:nvPr>
+        </p:nvSpPr>
+        <p:spPr>
+          <a:xfrm>
+            <a:off x="6377099" y="804672"/>
+            <a:ext cx="5010912" cy="5248656"/>
+          </a:xfrm>
+          <a:prstGeom prst="rect">
+            <a:avLst/>
+          </a:prstGeom>
+          <a:noFill/>
+          <a:ln w="6350">
+            <a:solidFill>
+              <a:schemeClr val="tx1">
+                <a:lumMod val="75000"/>
+                <a:lumOff val="25000"/>
+              </a:schemeClr>
+            </a:solidFill>
+          </a:ln>
+        </p:spPr>
+        <p:style>
+          <a:lnRef idx="2">
+            <a:schemeClr val="accent1">
+              <a:shade val="50000"/>
+            </a:schemeClr>
+          </a:lnRef>
+          <a:fillRef idx="1">
+            <a:schemeClr val="accent1"/>
+          </a:fillRef>
+          <a:effectRef idx="0">
+            <a:schemeClr val="accent1"/>
+          </a:effectRef>
+          <a:fontRef idx="minor">
+            <a:schemeClr val="lt1"/>
+          </a:fontRef>
+        </p:style>
+        <p:txBody>
+          <a:bodyPr rtlCol="0" anchor="ctr"/>
+          <a:lstStyle/>
+          <a:p>
+            <a:pPr algn="ctr"/>
+            <a:endParaRPr lang="en-US"/>
+          </a:p>
+        </p:txBody>
+      </p:sp>
+      <p:sp>
+        <p:nvSpPr>
           <p:cNvPr id="2" name="Title 1">
             <a:extLst>
               <a:ext uri="{FF2B5EF4-FFF2-40B4-BE49-F238E27FC236}">
@@ -5192,19 +5423,26 @@
             <p:ph type="title"/>
           </p:nvPr>
         </p:nvSpPr>
-        <p:spPr/>
-        <p:txBody>
-          <a:bodyPr/>
+        <p:spPr>
+          <a:xfrm>
+            <a:off x="6654304" y="1050247"/>
+            <a:ext cx="4472921" cy="1371600"/>
+          </a:xfrm>
+        </p:spPr>
+        <p:txBody>
+          <a:bodyPr>
+            <a:normAutofit/>
+          </a:bodyPr>
           <a:lstStyle/>
           <a:p>
             <a:r>
-              <a:rPr lang="en-US" b="0" dirty="0"/>
+              <a:rPr lang="en-US" sz="3100" b="0"/>
               <a:t>Building the server and Routes </a:t>
             </a:r>
             <a:br>
-              <a:rPr lang="en-US" b="0" dirty="0"/>
+              <a:rPr lang="en-US" sz="3100" b="0"/>
             </a:br>
-            <a:endParaRPr lang="en-US" dirty="0"/>
+            <a:endParaRPr lang="en-US" sz="3100"/>
           </a:p>
         </p:txBody>
       </p:sp>
@@ -5224,11 +5462,35 @@
             <p:ph idx="1"/>
           </p:nvPr>
         </p:nvSpPr>
-        <p:spPr/>
-        <p:txBody>
-          <a:bodyPr/>
+        <p:spPr>
+          <a:xfrm>
+            <a:off x="6654304" y="2605741"/>
+            <a:ext cx="4472922" cy="3131672"/>
+          </a:xfrm>
+        </p:spPr>
+        <p:txBody>
+          <a:bodyPr>
+            <a:normAutofit/>
+          </a:bodyPr>
           <a:lstStyle/>
           <a:p>
+            <a:r>
+              <a:rPr lang="en-US" dirty="0"/>
+              <a:t>We are using Python Flask for building a server that interact with MongoDB and render the html page that contains our charts. Modifying </a:t>
+            </a:r>
+            <a:r>
+              <a:rPr lang="en-US" dirty="0" err="1"/>
+              <a:t>app.py</a:t>
+            </a:r>
+            <a:r>
+              <a:rPr lang="en-US" dirty="0"/>
+              <a:t> folder to include the MongoDB query to retrieve all the records from MongoDB along the attributes using separate routes for each database.</a:t>
+            </a:r>
+          </a:p>
+          <a:p>
+            <a:pPr marL="0" indent="0">
+              <a:buNone/>
+            </a:pPr>
             <a:endParaRPr lang="en-US" dirty="0"/>
           </a:p>
         </p:txBody>
@@ -5249,6 +5511,14 @@
 <file path=ppt/slides/slide11.xml><?xml version="1.0" encoding="utf-8"?>
 <p:sld xmlns:a="http://schemas.openxmlformats.org/drawingml/2006/main" xmlns:r="http://schemas.openxmlformats.org/officeDocument/2006/relationships" xmlns:p="http://schemas.openxmlformats.org/presentationml/2006/main">
   <p:cSld>
+    <p:bg>
+      <p:bgPr>
+        <a:solidFill>
+          <a:schemeClr val="bg1"/>
+        </a:solidFill>
+        <a:effectLst/>
+      </p:bgPr>
+    </p:bg>
     <p:spTree>
       <p:nvGrpSpPr>
         <p:cNvPr id="1" name=""/>
@@ -5279,22 +5549,144 @@
             <p:ph type="title"/>
           </p:nvPr>
         </p:nvSpPr>
-        <p:spPr/>
-        <p:txBody>
-          <a:bodyPr/>
+        <p:spPr>
+          <a:xfrm>
+            <a:off x="6579450" y="727627"/>
+            <a:ext cx="4957553" cy="1645920"/>
+          </a:xfrm>
+        </p:spPr>
+        <p:txBody>
+          <a:bodyPr>
+            <a:normAutofit/>
+          </a:bodyPr>
           <a:lstStyle/>
           <a:p>
             <a:r>
-              <a:rPr lang="en-US" b="0" dirty="0"/>
+              <a:rPr lang="en-US" sz="3600" b="0"/>
               <a:t>Front-end side preparation</a:t>
             </a:r>
             <a:br>
-              <a:rPr lang="en-US" b="0" dirty="0"/>
+              <a:rPr lang="en-US" sz="3600" b="0"/>
             </a:br>
-            <a:endParaRPr lang="en-US" dirty="0"/>
-          </a:p>
-        </p:txBody>
-      </p:sp>
+            <a:endParaRPr lang="en-US" sz="3600"/>
+          </a:p>
+        </p:txBody>
+      </p:sp>
+      <p:sp>
+        <p:nvSpPr>
+          <p:cNvPr id="10" name="Rectangle 9">
+            <a:extLst>
+              <a:ext uri="{FF2B5EF4-FFF2-40B4-BE49-F238E27FC236}">
+                <a16:creationId xmlns:a16="http://schemas.microsoft.com/office/drawing/2014/main" id="{0BBB6B01-5B73-410C-B70E-8CF2FA470D11}"/>
+              </a:ext>
+              <a:ext uri="{C183D7F6-B498-43B3-948B-1728B52AA6E4}">
+                <adec:decorative xmlns:adec="http://schemas.microsoft.com/office/drawing/2017/decorative" val="1"/>
+              </a:ext>
+            </a:extLst>
+          </p:cNvPr>
+          <p:cNvSpPr>
+            <a:spLocks noGrp="1" noRot="1" noChangeAspect="1" noMove="1" noResize="1" noEditPoints="1" noAdjustHandles="1" noChangeArrowheads="1" noChangeShapeType="1" noTextEdit="1"/>
+          </p:cNvSpPr>
+          <p:nvPr>
+            <p:extLst>
+              <p:ext uri="{386F3935-93C4-4BCD-93E2-E3B085C9AB24}">
+                <p16:designElem xmlns:p16="http://schemas.microsoft.com/office/powerpoint/2015/main" val="1"/>
+              </p:ext>
+            </p:extLst>
+          </p:nvPr>
+        </p:nvSpPr>
+        <p:spPr>
+          <a:xfrm>
+            <a:off x="728836" y="721224"/>
+            <a:ext cx="5367164" cy="5415552"/>
+          </a:xfrm>
+          <a:prstGeom prst="rect">
+            <a:avLst/>
+          </a:prstGeom>
+          <a:solidFill>
+            <a:srgbClr val="FFFFFF"/>
+          </a:solidFill>
+          <a:ln w="6350" cap="flat" cmpd="sng" algn="ctr">
+            <a:noFill/>
+            <a:prstDash val="solid"/>
+          </a:ln>
+          <a:effectLst>
+            <a:softEdge rad="0"/>
+          </a:effectLst>
+        </p:spPr>
+      </p:sp>
+      <p:sp>
+        <p:nvSpPr>
+          <p:cNvPr id="12" name="Rectangle 11">
+            <a:extLst>
+              <a:ext uri="{FF2B5EF4-FFF2-40B4-BE49-F238E27FC236}">
+                <a16:creationId xmlns:a16="http://schemas.microsoft.com/office/drawing/2014/main" id="{8712F587-12D0-435C-8E3F-F44C36EE71B8}"/>
+              </a:ext>
+              <a:ext uri="{C183D7F6-B498-43B3-948B-1728B52AA6E4}">
+                <adec:decorative xmlns:adec="http://schemas.microsoft.com/office/drawing/2017/decorative" val="1"/>
+              </a:ext>
+            </a:extLst>
+          </p:cNvPr>
+          <p:cNvSpPr>
+            <a:spLocks noGrp="1" noRot="1" noChangeAspect="1" noMove="1" noResize="1" noEditPoints="1" noAdjustHandles="1" noChangeArrowheads="1" noChangeShapeType="1" noTextEdit="1"/>
+          </p:cNvSpPr>
+          <p:nvPr>
+            <p:extLst>
+              <p:ext uri="{386F3935-93C4-4BCD-93E2-E3B085C9AB24}">
+                <p16:designElem xmlns:p16="http://schemas.microsoft.com/office/powerpoint/2015/main" val="1"/>
+              </p:ext>
+            </p:extLst>
+          </p:nvPr>
+        </p:nvSpPr>
+        <p:spPr>
+          <a:xfrm>
+            <a:off x="885217" y="892220"/>
+            <a:ext cx="5054517" cy="5097085"/>
+          </a:xfrm>
+          <a:prstGeom prst="rect">
+            <a:avLst/>
+          </a:prstGeom>
+          <a:noFill/>
+          <a:ln w="6350" cap="sq" cmpd="sng" algn="ctr">
+            <a:solidFill>
+              <a:srgbClr val="404040"/>
+            </a:solidFill>
+            <a:prstDash val="solid"/>
+            <a:miter lim="800000"/>
+          </a:ln>
+          <a:effectLst/>
+        </p:spPr>
+      </p:sp>
+      <p:pic>
+        <p:nvPicPr>
+          <p:cNvPr id="5" name="Picture 4" descr="A screenshot of a cell phone&#10;&#10;Description automatically generated">
+            <a:extLst>
+              <a:ext uri="{FF2B5EF4-FFF2-40B4-BE49-F238E27FC236}">
+                <a16:creationId xmlns:a16="http://schemas.microsoft.com/office/drawing/2014/main" id="{FFCB5F41-4C30-A047-BDC2-9C9586B2D789}"/>
+              </a:ext>
+            </a:extLst>
+          </p:cNvPr>
+          <p:cNvPicPr>
+            <a:picLocks noChangeAspect="1"/>
+          </p:cNvPicPr>
+          <p:nvPr/>
+        </p:nvPicPr>
+        <p:blipFill>
+          <a:blip r:embed="rId2"/>
+          <a:stretch>
+            <a:fillRect/>
+          </a:stretch>
+        </p:blipFill>
+        <p:spPr>
+          <a:xfrm>
+            <a:off x="1515091" y="1206900"/>
+            <a:ext cx="3794767" cy="4462365"/>
+          </a:xfrm>
+          <a:prstGeom prst="rect">
+            <a:avLst/>
+          </a:prstGeom>
+        </p:spPr>
+      </p:pic>
       <p:sp>
         <p:nvSpPr>
           <p:cNvPr id="3" name="Content Placeholder 2">
@@ -5311,12 +5703,92 @@
             <p:ph idx="1"/>
           </p:nvPr>
         </p:nvSpPr>
-        <p:spPr/>
-        <p:txBody>
-          <a:bodyPr/>
+        <p:spPr>
+          <a:xfrm>
+            <a:off x="6579450" y="2538919"/>
+            <a:ext cx="4957554" cy="3496120"/>
+          </a:xfrm>
+        </p:spPr>
+        <p:txBody>
+          <a:bodyPr>
+            <a:normAutofit/>
+          </a:bodyPr>
           <a:lstStyle/>
           <a:p>
-            <a:endParaRPr lang="en-US"/>
+            <a:r>
+              <a:rPr lang="en-US" dirty="0"/>
+              <a:t>Now that we have the server side code and the MongoDB query ready, we will start building the front end code.</a:t>
+            </a:r>
+          </a:p>
+          <a:p>
+            <a:r>
+              <a:rPr lang="en-US" dirty="0"/>
+              <a:t>For building the charts, we will be mainly using  these list of </a:t>
+            </a:r>
+            <a:r>
+              <a:rPr lang="en-US" dirty="0" err="1"/>
+              <a:t>Javascript</a:t>
+            </a:r>
+            <a:r>
+              <a:rPr lang="en-US" dirty="0"/>
+              <a:t> libraries d3.js, </a:t>
+            </a:r>
+            <a:r>
+              <a:rPr lang="en-US" dirty="0" err="1"/>
+              <a:t>Leaflet.js</a:t>
+            </a:r>
+            <a:r>
+              <a:rPr lang="en-US" dirty="0"/>
+              <a:t>, </a:t>
+            </a:r>
+            <a:r>
+              <a:rPr lang="en-US" dirty="0" err="1"/>
+              <a:t>Plotly.js</a:t>
+            </a:r>
+            <a:r>
+              <a:rPr lang="en-US" dirty="0"/>
+              <a:t>, Google charts,</a:t>
+            </a:r>
+          </a:p>
+          <a:p>
+            <a:pPr marL="0" indent="0">
+              <a:buNone/>
+            </a:pPr>
+            <a:r>
+              <a:rPr lang="en-US" dirty="0"/>
+              <a:t>   dc Charts ( for filtering the data set)</a:t>
+            </a:r>
+          </a:p>
+          <a:p>
+            <a:r>
+              <a:rPr lang="en-US" dirty="0"/>
+              <a:t>We will also be using </a:t>
+            </a:r>
+            <a:r>
+              <a:rPr lang="en-US" dirty="0">
+                <a:hlinkClick r:id="rId3"/>
+              </a:rPr>
+              <a:t>Bootstrap</a:t>
+            </a:r>
+            <a:r>
+              <a:rPr lang="en-US" dirty="0"/>
+              <a:t> for responsiveness, CSS for styling</a:t>
+            </a:r>
+          </a:p>
+          <a:p>
+            <a:r>
+              <a:rPr lang="en-US" dirty="0"/>
+              <a:t>Below is the folder structure of our project :</a:t>
+            </a:r>
+          </a:p>
+          <a:p>
+            <a:pPr marL="0" indent="0">
+              <a:buNone/>
+            </a:pPr>
+            <a:endParaRPr lang="en-US" dirty="0"/>
+          </a:p>
+          <a:p>
+            <a:endParaRPr lang="en-US" dirty="0"/>
           </a:p>
         </p:txBody>
       </p:sp>
@@ -5403,10 +5875,46 @@
           <a:bodyPr/>
           <a:lstStyle/>
           <a:p>
+            <a:r>
+              <a:rPr lang="en-US" dirty="0"/>
+              <a:t>D3.json () promise calls to get the data from the routes to create individual charts :</a:t>
+            </a:r>
+          </a:p>
+          <a:p>
             <a:endParaRPr lang="en-US" dirty="0"/>
           </a:p>
         </p:txBody>
       </p:sp>
+      <p:pic>
+        <p:nvPicPr>
+          <p:cNvPr id="9" name="Picture 8" descr="A screen shot of a computer&#10;&#10;Description automatically generated">
+            <a:extLst>
+              <a:ext uri="{FF2B5EF4-FFF2-40B4-BE49-F238E27FC236}">
+                <a16:creationId xmlns:a16="http://schemas.microsoft.com/office/drawing/2014/main" id="{EB5FFD71-1E96-2245-985B-2EC495F6D50C}"/>
+              </a:ext>
+            </a:extLst>
+          </p:cNvPr>
+          <p:cNvPicPr>
+            <a:picLocks noChangeAspect="1"/>
+          </p:cNvPicPr>
+          <p:nvPr/>
+        </p:nvPicPr>
+        <p:blipFill>
+          <a:blip r:embed="rId2"/>
+          <a:stretch>
+            <a:fillRect/>
+          </a:stretch>
+        </p:blipFill>
+        <p:spPr>
+          <a:xfrm>
+            <a:off x="1368258" y="2634581"/>
+            <a:ext cx="6832600" cy="2070100"/>
+          </a:xfrm>
+          <a:prstGeom prst="rect">
+            <a:avLst/>
+          </a:prstGeom>
+        </p:spPr>
+      </p:pic>
     </p:spTree>
     <p:extLst>
       <p:ext uri="{BB962C8B-B14F-4D97-AF65-F5344CB8AC3E}">
@@ -6687,6 +7195,117 @@
           <a:bodyPr/>
           <a:lstStyle/>
           <a:p>
+            <a:pPr>
+              <a:buFontTx/>
+              <a:buChar char="-"/>
+            </a:pPr>
+            <a:r>
+              <a:rPr lang="en-US" dirty="0"/>
+              <a:t>After downloading the csv files from the JH and NYT </a:t>
+            </a:r>
+            <a:r>
+              <a:rPr lang="en-US" dirty="0" err="1"/>
+              <a:t>github</a:t>
+            </a:r>
+            <a:r>
+              <a:rPr lang="en-US" dirty="0"/>
+              <a:t> page, used python script to grab the files and convert to json.</a:t>
+            </a:r>
+          </a:p>
+          <a:p>
+            <a:pPr>
+              <a:buFontTx/>
+              <a:buChar char="-"/>
+            </a:pPr>
+            <a:r>
+              <a:rPr lang="en-US" dirty="0"/>
+              <a:t>The attributes being used is :</a:t>
+            </a:r>
+          </a:p>
+          <a:p>
+            <a:pPr marL="0" indent="0">
+              <a:buNone/>
+            </a:pPr>
+            <a:r>
+              <a:rPr lang="en-US" dirty="0"/>
+              <a:t>      time series dates till now, Country, </a:t>
+            </a:r>
+            <a:r>
+              <a:rPr lang="en-US" dirty="0" err="1"/>
+              <a:t>Provice_State</a:t>
+            </a:r>
+            <a:r>
+              <a:rPr lang="en-US" dirty="0"/>
+              <a:t>, Counties, confirmed cases, Death and Recovered.</a:t>
+            </a:r>
+          </a:p>
+          <a:p>
+            <a:pPr>
+              <a:buFontTx/>
+              <a:buChar char="-"/>
+            </a:pPr>
+            <a:r>
+              <a:rPr lang="en-US" dirty="0"/>
+              <a:t>Now that we have the data, next step is  storing and querying the data using MongoDB :</a:t>
+            </a:r>
+          </a:p>
+          <a:p>
+            <a:pPr marL="0" indent="0">
+              <a:buNone/>
+            </a:pPr>
+            <a:r>
+              <a:rPr lang="en-US" dirty="0"/>
+              <a:t>     - separate databases for confirmed, deaths, recovered global data till date</a:t>
+            </a:r>
+          </a:p>
+          <a:p>
+            <a:pPr marL="0" indent="0">
+              <a:buNone/>
+            </a:pPr>
+            <a:r>
+              <a:rPr lang="en-US" dirty="0"/>
+              <a:t>     - separate database for confirmed and deaths for United States till now</a:t>
+            </a:r>
+          </a:p>
+          <a:p>
+            <a:pPr marL="0" indent="0">
+              <a:buNone/>
+            </a:pPr>
+            <a:r>
+              <a:rPr lang="en-US" dirty="0"/>
+              <a:t>     - separate database for counties and States of US</a:t>
+            </a:r>
+          </a:p>
+          <a:p>
+            <a:pPr marL="0" indent="0">
+              <a:buNone/>
+            </a:pPr>
+            <a:endParaRPr lang="en-US" dirty="0"/>
+          </a:p>
+          <a:p>
+            <a:pPr marL="0" indent="0">
+              <a:buNone/>
+            </a:pPr>
+            <a:r>
+              <a:rPr lang="en-US" dirty="0"/>
+              <a:t>- Used </a:t>
+            </a:r>
+            <a:r>
+              <a:rPr lang="en-US" dirty="0" err="1"/>
+              <a:t>PyMongo</a:t>
+            </a:r>
+            <a:r>
+              <a:rPr lang="en-US" dirty="0"/>
+              <a:t> for connecting to MongoDB and querying the data</a:t>
+            </a:r>
+          </a:p>
+          <a:p>
+            <a:pPr marL="0" indent="0">
+              <a:buNone/>
+            </a:pPr>
+            <a:endParaRPr lang="en-US" dirty="0"/>
+          </a:p>
+          <a:p>
             <a:pPr marL="0" indent="0">
               <a:buNone/>
             </a:pPr>
@@ -6767,31 +7386,35 @@
           </a:p>
         </p:txBody>
       </p:sp>
-      <p:sp>
-        <p:nvSpPr>
-          <p:cNvPr id="3" name="Content Placeholder 2">
+      <p:pic>
+        <p:nvPicPr>
+          <p:cNvPr id="5" name="Content Placeholder 4" descr="A screenshot of a social media post&#10;&#10;Description automatically generated">
             <a:extLst>
               <a:ext uri="{FF2B5EF4-FFF2-40B4-BE49-F238E27FC236}">
-                <a16:creationId xmlns:a16="http://schemas.microsoft.com/office/drawing/2014/main" id="{34C28BEA-29DC-8C48-980F-54F4ED6A7248}"/>
+                <a16:creationId xmlns:a16="http://schemas.microsoft.com/office/drawing/2014/main" id="{A78B164F-3C64-3847-B3D6-55D29E365D13}"/>
               </a:ext>
             </a:extLst>
           </p:cNvPr>
-          <p:cNvSpPr>
-            <a:spLocks noGrp="1"/>
-          </p:cNvSpPr>
+          <p:cNvPicPr>
+            <a:picLocks noGrp="1" noChangeAspect="1"/>
+          </p:cNvPicPr>
           <p:nvPr>
             <p:ph idx="1"/>
           </p:nvPr>
-        </p:nvSpPr>
-        <p:spPr/>
-        <p:txBody>
-          <a:bodyPr/>
-          <a:lstStyle/>
-          <a:p>
-            <a:endParaRPr lang="en-US"/>
-          </a:p>
-        </p:txBody>
-      </p:sp>
+        </p:nvPicPr>
+        <p:blipFill>
+          <a:blip r:embed="rId2"/>
+          <a:stretch>
+            <a:fillRect/>
+          </a:stretch>
+        </p:blipFill>
+        <p:spPr>
+          <a:xfrm>
+            <a:off x="2589245" y="2103438"/>
+            <a:ext cx="7013510" cy="3849687"/>
+          </a:xfrm>
+        </p:spPr>
+      </p:pic>
     </p:spTree>
     <p:extLst>
       <p:ext uri="{BB962C8B-B14F-4D97-AF65-F5344CB8AC3E}">

</xml_diff>

<commit_message>
update the presentation with the layout of teh project
</commit_message>
<xml_diff>
--- a/Presentation/Project 1 Presentation.pptx
+++ b/Presentation/Project 1 Presentation.pptx
@@ -5,7 +5,7 @@
     <p:sldMasterId id="2147483719" r:id="rId1"/>
   </p:sldMasterIdLst>
   <p:notesMasterIdLst>
-    <p:notesMasterId r:id="rId16"/>
+    <p:notesMasterId r:id="rId18"/>
   </p:notesMasterIdLst>
   <p:sldIdLst>
     <p:sldId id="256" r:id="rId2"/>
@@ -20,8 +20,10 @@
     <p:sldId id="280" r:id="rId11"/>
     <p:sldId id="281" r:id="rId12"/>
     <p:sldId id="282" r:id="rId13"/>
-    <p:sldId id="283" r:id="rId14"/>
-    <p:sldId id="274" r:id="rId15"/>
+    <p:sldId id="285" r:id="rId14"/>
+    <p:sldId id="286" r:id="rId15"/>
+    <p:sldId id="283" r:id="rId16"/>
+    <p:sldId id="274" r:id="rId17"/>
   </p:sldIdLst>
   <p:sldSz cx="12192000" cy="6858000"/>
   <p:notesSz cx="6858000" cy="9144000"/>
@@ -5747,16 +5749,7 @@
             </a:r>
             <a:r>
               <a:rPr lang="en-US" dirty="0"/>
-              <a:t>, Google charts,</a:t>
-            </a:r>
-          </a:p>
-          <a:p>
-            <a:pPr marL="0" indent="0">
-              <a:buNone/>
-            </a:pPr>
-            <a:r>
-              <a:rPr lang="en-US" dirty="0"/>
-              <a:t>   dc Charts ( for filtering the data set)</a:t>
+              <a:t>, Google charts, dc Charts ( for filtering the data set) and D3 to do header   animation</a:t>
             </a:r>
           </a:p>
           <a:p>
@@ -5950,6 +5943,249 @@
           <p:cNvPr id="2" name="Title 1">
             <a:extLst>
               <a:ext uri="{FF2B5EF4-FFF2-40B4-BE49-F238E27FC236}">
+                <a16:creationId xmlns:a16="http://schemas.microsoft.com/office/drawing/2014/main" id="{7C5414D2-8E8E-7945-84F5-BAE104269181}"/>
+              </a:ext>
+            </a:extLst>
+          </p:cNvPr>
+          <p:cNvSpPr>
+            <a:spLocks noGrp="1"/>
+          </p:cNvSpPr>
+          <p:nvPr>
+            <p:ph type="title"/>
+          </p:nvPr>
+        </p:nvSpPr>
+        <p:spPr/>
+        <p:txBody>
+          <a:bodyPr/>
+          <a:lstStyle/>
+          <a:p>
+            <a:r>
+              <a:rPr lang="en-US" b="0" dirty="0"/>
+              <a:t>Building the charts ( continued)</a:t>
+            </a:r>
+            <a:endParaRPr lang="en-US" dirty="0"/>
+          </a:p>
+        </p:txBody>
+      </p:sp>
+      <p:pic>
+        <p:nvPicPr>
+          <p:cNvPr id="5" name="Content Placeholder 4" descr="A screenshot of a cell phone&#10;&#10;Description automatically generated">
+            <a:extLst>
+              <a:ext uri="{FF2B5EF4-FFF2-40B4-BE49-F238E27FC236}">
+                <a16:creationId xmlns:a16="http://schemas.microsoft.com/office/drawing/2014/main" id="{7020ABB7-E015-EE44-8FA4-E717BB5BEABC}"/>
+              </a:ext>
+            </a:extLst>
+          </p:cNvPr>
+          <p:cNvPicPr>
+            <a:picLocks noGrp="1" noChangeAspect="1"/>
+          </p:cNvPicPr>
+          <p:nvPr>
+            <p:ph idx="1"/>
+          </p:nvPr>
+        </p:nvPicPr>
+        <p:blipFill>
+          <a:blip r:embed="rId2"/>
+          <a:stretch>
+            <a:fillRect/>
+          </a:stretch>
+        </p:blipFill>
+        <p:spPr>
+          <a:xfrm>
+            <a:off x="588206" y="2242845"/>
+            <a:ext cx="5507794" cy="3051050"/>
+          </a:xfrm>
+        </p:spPr>
+      </p:pic>
+      <p:pic>
+        <p:nvPicPr>
+          <p:cNvPr id="7" name="Picture 6" descr="A close up of a map&#10;&#10;Description automatically generated">
+            <a:extLst>
+              <a:ext uri="{FF2B5EF4-FFF2-40B4-BE49-F238E27FC236}">
+                <a16:creationId xmlns:a16="http://schemas.microsoft.com/office/drawing/2014/main" id="{B24FF0D1-DEE3-3B42-895F-194C11009152}"/>
+              </a:ext>
+            </a:extLst>
+          </p:cNvPr>
+          <p:cNvPicPr>
+            <a:picLocks noChangeAspect="1"/>
+          </p:cNvPicPr>
+          <p:nvPr/>
+        </p:nvPicPr>
+        <p:blipFill>
+          <a:blip r:embed="rId3"/>
+          <a:stretch>
+            <a:fillRect/>
+          </a:stretch>
+        </p:blipFill>
+        <p:spPr>
+          <a:xfrm>
+            <a:off x="6311626" y="2242845"/>
+            <a:ext cx="5292168" cy="3051050"/>
+          </a:xfrm>
+          <a:prstGeom prst="rect">
+            <a:avLst/>
+          </a:prstGeom>
+        </p:spPr>
+      </p:pic>
+    </p:spTree>
+    <p:extLst>
+      <p:ext uri="{BB962C8B-B14F-4D97-AF65-F5344CB8AC3E}">
+        <p14:creationId xmlns:p14="http://schemas.microsoft.com/office/powerpoint/2010/main" val="844959091"/>
+      </p:ext>
+    </p:extLst>
+  </p:cSld>
+  <p:clrMapOvr>
+    <a:masterClrMapping/>
+  </p:clrMapOvr>
+</p:sld>
+</file>
+
+<file path=ppt/slides/slide14.xml><?xml version="1.0" encoding="utf-8"?>
+<p:sld xmlns:a="http://schemas.openxmlformats.org/drawingml/2006/main" xmlns:r="http://schemas.openxmlformats.org/officeDocument/2006/relationships" xmlns:p="http://schemas.openxmlformats.org/presentationml/2006/main">
+  <p:cSld>
+    <p:spTree>
+      <p:nvGrpSpPr>
+        <p:cNvPr id="1" name=""/>
+        <p:cNvGrpSpPr/>
+        <p:nvPr/>
+      </p:nvGrpSpPr>
+      <p:grpSpPr>
+        <a:xfrm>
+          <a:off x="0" y="0"/>
+          <a:ext cx="0" cy="0"/>
+          <a:chOff x="0" y="0"/>
+          <a:chExt cx="0" cy="0"/>
+        </a:xfrm>
+      </p:grpSpPr>
+      <p:sp>
+        <p:nvSpPr>
+          <p:cNvPr id="2" name="Title 1">
+            <a:extLst>
+              <a:ext uri="{FF2B5EF4-FFF2-40B4-BE49-F238E27FC236}">
+                <a16:creationId xmlns:a16="http://schemas.microsoft.com/office/drawing/2014/main" id="{DBF25253-9737-314E-A405-B2D75088E596}"/>
+              </a:ext>
+            </a:extLst>
+          </p:cNvPr>
+          <p:cNvSpPr>
+            <a:spLocks noGrp="1"/>
+          </p:cNvSpPr>
+          <p:nvPr>
+            <p:ph type="title"/>
+          </p:nvPr>
+        </p:nvSpPr>
+        <p:spPr/>
+        <p:txBody>
+          <a:bodyPr/>
+          <a:lstStyle/>
+          <a:p>
+            <a:r>
+              <a:rPr lang="en-US" b="0" dirty="0"/>
+              <a:t>Building the charts with filtering </a:t>
+            </a:r>
+            <a:br>
+              <a:rPr lang="en-US" b="0" dirty="0"/>
+            </a:br>
+            <a:r>
+              <a:rPr lang="en-US" b="0" dirty="0"/>
+              <a:t>( continued)</a:t>
+            </a:r>
+            <a:endParaRPr lang="en-US" dirty="0"/>
+          </a:p>
+        </p:txBody>
+      </p:sp>
+      <p:pic>
+        <p:nvPicPr>
+          <p:cNvPr id="5" name="Content Placeholder 4" descr="A screenshot of a cell phone&#10;&#10;Description automatically generated">
+            <a:extLst>
+              <a:ext uri="{FF2B5EF4-FFF2-40B4-BE49-F238E27FC236}">
+                <a16:creationId xmlns:a16="http://schemas.microsoft.com/office/drawing/2014/main" id="{CF9FBE16-B331-0346-8666-DE6A29A62CB2}"/>
+              </a:ext>
+            </a:extLst>
+          </p:cNvPr>
+          <p:cNvPicPr>
+            <a:picLocks noGrp="1" noChangeAspect="1"/>
+          </p:cNvPicPr>
+          <p:nvPr>
+            <p:ph idx="1"/>
+          </p:nvPr>
+        </p:nvPicPr>
+        <p:blipFill>
+          <a:blip r:embed="rId2"/>
+          <a:stretch>
+            <a:fillRect/>
+          </a:stretch>
+        </p:blipFill>
+        <p:spPr>
+          <a:xfrm>
+            <a:off x="466124" y="2211723"/>
+            <a:ext cx="5407324" cy="3226552"/>
+          </a:xfrm>
+        </p:spPr>
+      </p:pic>
+      <p:pic>
+        <p:nvPicPr>
+          <p:cNvPr id="7" name="Picture 6" descr="A screenshot of a cell phone&#10;&#10;Description automatically generated">
+            <a:extLst>
+              <a:ext uri="{FF2B5EF4-FFF2-40B4-BE49-F238E27FC236}">
+                <a16:creationId xmlns:a16="http://schemas.microsoft.com/office/drawing/2014/main" id="{E15396DA-58CD-134A-BA1E-502668997D55}"/>
+              </a:ext>
+            </a:extLst>
+          </p:cNvPr>
+          <p:cNvPicPr>
+            <a:picLocks noChangeAspect="1"/>
+          </p:cNvPicPr>
+          <p:nvPr/>
+        </p:nvPicPr>
+        <p:blipFill>
+          <a:blip r:embed="rId3"/>
+          <a:stretch>
+            <a:fillRect/>
+          </a:stretch>
+        </p:blipFill>
+        <p:spPr>
+          <a:xfrm>
+            <a:off x="6190415" y="2211723"/>
+            <a:ext cx="5535461" cy="3226552"/>
+          </a:xfrm>
+          <a:prstGeom prst="rect">
+            <a:avLst/>
+          </a:prstGeom>
+        </p:spPr>
+      </p:pic>
+    </p:spTree>
+    <p:extLst>
+      <p:ext uri="{BB962C8B-B14F-4D97-AF65-F5344CB8AC3E}">
+        <p14:creationId xmlns:p14="http://schemas.microsoft.com/office/powerpoint/2010/main" val="1090864901"/>
+      </p:ext>
+    </p:extLst>
+  </p:cSld>
+  <p:clrMapOvr>
+    <a:masterClrMapping/>
+  </p:clrMapOvr>
+</p:sld>
+</file>
+
+<file path=ppt/slides/slide15.xml><?xml version="1.0" encoding="utf-8"?>
+<p:sld xmlns:a="http://schemas.openxmlformats.org/drawingml/2006/main" xmlns:r="http://schemas.openxmlformats.org/officeDocument/2006/relationships" xmlns:p="http://schemas.openxmlformats.org/presentationml/2006/main">
+  <p:cSld>
+    <p:spTree>
+      <p:nvGrpSpPr>
+        <p:cNvPr id="1" name=""/>
+        <p:cNvGrpSpPr/>
+        <p:nvPr/>
+      </p:nvGrpSpPr>
+      <p:grpSpPr>
+        <a:xfrm>
+          <a:off x="0" y="0"/>
+          <a:ext cx="0" cy="0"/>
+          <a:chOff x="0" y="0"/>
+          <a:chExt cx="0" cy="0"/>
+        </a:xfrm>
+      </p:grpSpPr>
+      <p:sp>
+        <p:nvSpPr>
+          <p:cNvPr id="2" name="Title 1">
+            <a:extLst>
+              <a:ext uri="{FF2B5EF4-FFF2-40B4-BE49-F238E27FC236}">
                 <a16:creationId xmlns:a16="http://schemas.microsoft.com/office/drawing/2014/main" id="{39B23943-76F7-C14E-96F6-89EAED829F2E}"/>
               </a:ext>
             </a:extLst>
@@ -6015,7 +6251,7 @@
 </p:sld>
 </file>
 
-<file path=ppt/slides/slide14.xml><?xml version="1.0" encoding="utf-8"?>
+<file path=ppt/slides/slide16.xml><?xml version="1.0" encoding="utf-8"?>
 <p:sld xmlns:a="http://schemas.openxmlformats.org/drawingml/2006/main" xmlns:r="http://schemas.openxmlformats.org/officeDocument/2006/relationships" xmlns:p="http://schemas.openxmlformats.org/presentationml/2006/main">
   <p:cSld>
     <p:bg>

</xml_diff>